<commit_message>
Slowly implementing computation examples.
</commit_message>
<xml_diff>
--- a/images/DeLaat1980.pptx
+++ b/images/DeLaat1980.pptx
@@ -5,11 +5,12 @@
     <p:sldMasterId id="2147483660" r:id="rId1"/>
   </p:sldMasterIdLst>
   <p:notesMasterIdLst>
-    <p:notesMasterId r:id="rId4"/>
+    <p:notesMasterId r:id="rId5"/>
   </p:notesMasterIdLst>
   <p:sldIdLst>
     <p:sldId id="256" r:id="rId2"/>
     <p:sldId id="257" r:id="rId3"/>
+    <p:sldId id="258" r:id="rId4"/>
   </p:sldIdLst>
   <p:sldSz cx="9144000" cy="6858000" type="screen4x3"/>
   <p:notesSz cx="6858000" cy="9144000"/>
@@ -536,6 +537,90 @@
     <p:extLst>
       <p:ext uri="{BB962C8B-B14F-4D97-AF65-F5344CB8AC3E}">
         <p14:creationId xmlns:p14="http://schemas.microsoft.com/office/powerpoint/2010/main" val="3585595154"/>
+      </p:ext>
+    </p:extLst>
+  </p:cSld>
+  <p:clrMapOvr>
+    <a:masterClrMapping/>
+  </p:clrMapOvr>
+</p:notes>
+</file>
+
+<file path=ppt/notesSlides/notesSlide2.xml><?xml version="1.0" encoding="utf-8"?>
+<p:notes xmlns:a="http://schemas.openxmlformats.org/drawingml/2006/main" xmlns:r="http://schemas.openxmlformats.org/officeDocument/2006/relationships" xmlns:p="http://schemas.openxmlformats.org/presentationml/2006/main">
+  <p:cSld>
+    <p:spTree>
+      <p:nvGrpSpPr>
+        <p:cNvPr id="1" name=""/>
+        <p:cNvGrpSpPr/>
+        <p:nvPr/>
+      </p:nvGrpSpPr>
+      <p:grpSpPr>
+        <a:xfrm>
+          <a:off x="0" y="0"/>
+          <a:ext cx="0" cy="0"/>
+          <a:chOff x="0" y="0"/>
+          <a:chExt cx="0" cy="0"/>
+        </a:xfrm>
+      </p:grpSpPr>
+      <p:sp>
+        <p:nvSpPr>
+          <p:cNvPr id="2" name="Slide Image Placeholder 1"/>
+          <p:cNvSpPr>
+            <a:spLocks noGrp="1" noRot="1" noChangeAspect="1"/>
+          </p:cNvSpPr>
+          <p:nvPr>
+            <p:ph type="sldImg"/>
+          </p:nvPr>
+        </p:nvSpPr>
+        <p:spPr/>
+      </p:sp>
+      <p:sp>
+        <p:nvSpPr>
+          <p:cNvPr id="3" name="Notes Placeholder 2"/>
+          <p:cNvSpPr>
+            <a:spLocks noGrp="1"/>
+          </p:cNvSpPr>
+          <p:nvPr>
+            <p:ph type="body" idx="1"/>
+          </p:nvPr>
+        </p:nvSpPr>
+        <p:spPr/>
+        <p:txBody>
+          <a:bodyPr/>
+          <a:lstStyle/>
+          <a:p>
+            <a:endParaRPr lang="en-NL" dirty="0"/>
+          </a:p>
+        </p:txBody>
+      </p:sp>
+      <p:sp>
+        <p:nvSpPr>
+          <p:cNvPr id="4" name="Slide Number Placeholder 3"/>
+          <p:cNvSpPr>
+            <a:spLocks noGrp="1"/>
+          </p:cNvSpPr>
+          <p:nvPr>
+            <p:ph type="sldNum" sz="quarter" idx="5"/>
+          </p:nvPr>
+        </p:nvSpPr>
+        <p:spPr/>
+        <p:txBody>
+          <a:bodyPr/>
+          <a:lstStyle/>
+          <a:p>
+            <a:fld id="{C5361349-F661-3C48-90B8-DFBB4AE35347}" type="slidenum">
+              <a:rPr lang="en-NL" smtClean="0"/>
+              <a:t>3</a:t>
+            </a:fld>
+            <a:endParaRPr lang="en-NL"/>
+          </a:p>
+        </p:txBody>
+      </p:sp>
+    </p:spTree>
+    <p:extLst>
+      <p:ext uri="{BB962C8B-B14F-4D97-AF65-F5344CB8AC3E}">
+        <p14:creationId xmlns:p14="http://schemas.microsoft.com/office/powerpoint/2010/main" val="1154039618"/>
       </p:ext>
     </p:extLst>
   </p:cSld>
@@ -5054,6 +5139,1581 @@
     <p:extLst>
       <p:ext uri="{BB962C8B-B14F-4D97-AF65-F5344CB8AC3E}">
         <p14:creationId xmlns:p14="http://schemas.microsoft.com/office/powerpoint/2010/main" val="2440357987"/>
+      </p:ext>
+    </p:extLst>
+  </p:cSld>
+  <p:clrMapOvr>
+    <a:masterClrMapping/>
+  </p:clrMapOvr>
+</p:sld>
+</file>
+
+<file path=ppt/slides/slide3.xml><?xml version="1.0" encoding="utf-8"?>
+<p:sld xmlns:a="http://schemas.openxmlformats.org/drawingml/2006/main" xmlns:r="http://schemas.openxmlformats.org/officeDocument/2006/relationships" xmlns:p="http://schemas.openxmlformats.org/presentationml/2006/main">
+  <p:cSld>
+    <p:spTree>
+      <p:nvGrpSpPr>
+        <p:cNvPr id="1" name=""/>
+        <p:cNvGrpSpPr/>
+        <p:nvPr/>
+      </p:nvGrpSpPr>
+      <p:grpSpPr>
+        <a:xfrm>
+          <a:off x="0" y="0"/>
+          <a:ext cx="0" cy="0"/>
+          <a:chOff x="0" y="0"/>
+          <a:chExt cx="0" cy="0"/>
+        </a:xfrm>
+      </p:grpSpPr>
+      <p:grpSp>
+        <p:nvGrpSpPr>
+          <p:cNvPr id="46" name="Group 45">
+            <a:extLst>
+              <a:ext uri="{FF2B5EF4-FFF2-40B4-BE49-F238E27FC236}">
+                <a16:creationId xmlns:a16="http://schemas.microsoft.com/office/drawing/2014/main" id="{F2DEED1F-19EA-4D8F-B9D5-B28A252E59FF}"/>
+              </a:ext>
+            </a:extLst>
+          </p:cNvPr>
+          <p:cNvGrpSpPr/>
+          <p:nvPr/>
+        </p:nvGrpSpPr>
+        <p:grpSpPr>
+          <a:xfrm>
+            <a:off x="1301383" y="1587"/>
+            <a:ext cx="6578441" cy="6832569"/>
+            <a:chOff x="1301383" y="1587"/>
+            <a:chExt cx="6578441" cy="6832569"/>
+          </a:xfrm>
+        </p:grpSpPr>
+        <p:sp>
+          <p:nvSpPr>
+            <p:cNvPr id="3" name="Rectangle 2">
+              <a:extLst>
+                <a:ext uri="{FF2B5EF4-FFF2-40B4-BE49-F238E27FC236}">
+                  <a16:creationId xmlns:a16="http://schemas.microsoft.com/office/drawing/2014/main" id="{71A966F7-A8AD-114B-F9CF-DD42EDA1D1CE}"/>
+                </a:ext>
+              </a:extLst>
+            </p:cNvPr>
+            <p:cNvSpPr/>
+            <p:nvPr/>
+          </p:nvSpPr>
+          <p:spPr>
+            <a:xfrm>
+              <a:off x="2002420" y="416689"/>
+              <a:ext cx="5382228" cy="5798916"/>
+            </a:xfrm>
+            <a:prstGeom prst="rect">
+              <a:avLst/>
+            </a:prstGeom>
+            <a:noFill/>
+            <a:ln>
+              <a:solidFill>
+                <a:srgbClr val="FF0000"/>
+              </a:solidFill>
+            </a:ln>
+          </p:spPr>
+          <p:style>
+            <a:lnRef idx="2">
+              <a:schemeClr val="accent1">
+                <a:shade val="15000"/>
+              </a:schemeClr>
+            </a:lnRef>
+            <a:fillRef idx="1">
+              <a:schemeClr val="accent1"/>
+            </a:fillRef>
+            <a:effectRef idx="0">
+              <a:schemeClr val="accent1"/>
+            </a:effectRef>
+            <a:fontRef idx="minor">
+              <a:schemeClr val="lt1"/>
+            </a:fontRef>
+          </p:style>
+          <p:txBody>
+            <a:bodyPr rtlCol="0" anchor="ctr"/>
+            <a:lstStyle/>
+            <a:p>
+              <a:pPr algn="ctr"/>
+              <a:endParaRPr lang="en-NL"/>
+            </a:p>
+          </p:txBody>
+        </p:sp>
+        <p:cxnSp>
+          <p:nvCxnSpPr>
+            <p:cNvPr id="5" name="Straight Connector 4">
+              <a:extLst>
+                <a:ext uri="{FF2B5EF4-FFF2-40B4-BE49-F238E27FC236}">
+                  <a16:creationId xmlns:a16="http://schemas.microsoft.com/office/drawing/2014/main" id="{F652CDB5-E8AD-EA6F-C444-FE7FB34F260B}"/>
+                </a:ext>
+              </a:extLst>
+            </p:cNvPr>
+            <p:cNvCxnSpPr>
+              <a:cxnSpLocks/>
+            </p:cNvCxnSpPr>
+            <p:nvPr/>
+          </p:nvCxnSpPr>
+          <p:spPr>
+            <a:xfrm>
+              <a:off x="1921398" y="694481"/>
+              <a:ext cx="5486400" cy="0"/>
+            </a:xfrm>
+            <a:prstGeom prst="line">
+              <a:avLst/>
+            </a:prstGeom>
+          </p:spPr>
+          <p:style>
+            <a:lnRef idx="2">
+              <a:schemeClr val="accent1"/>
+            </a:lnRef>
+            <a:fillRef idx="0">
+              <a:schemeClr val="accent1"/>
+            </a:fillRef>
+            <a:effectRef idx="1">
+              <a:schemeClr val="accent1"/>
+            </a:effectRef>
+            <a:fontRef idx="minor">
+              <a:schemeClr val="tx1"/>
+            </a:fontRef>
+          </p:style>
+        </p:cxnSp>
+        <p:cxnSp>
+          <p:nvCxnSpPr>
+            <p:cNvPr id="8" name="Straight Connector 7">
+              <a:extLst>
+                <a:ext uri="{FF2B5EF4-FFF2-40B4-BE49-F238E27FC236}">
+                  <a16:creationId xmlns:a16="http://schemas.microsoft.com/office/drawing/2014/main" id="{4377E71A-2174-DBD9-4A0F-9CDB7C06624B}"/>
+                </a:ext>
+              </a:extLst>
+            </p:cNvPr>
+            <p:cNvCxnSpPr>
+              <a:cxnSpLocks/>
+            </p:cNvCxnSpPr>
+            <p:nvPr/>
+          </p:nvCxnSpPr>
+          <p:spPr>
+            <a:xfrm>
+              <a:off x="1967695" y="2108521"/>
+              <a:ext cx="5486400" cy="0"/>
+            </a:xfrm>
+            <a:prstGeom prst="line">
+              <a:avLst/>
+            </a:prstGeom>
+          </p:spPr>
+          <p:style>
+            <a:lnRef idx="2">
+              <a:schemeClr val="accent1"/>
+            </a:lnRef>
+            <a:fillRef idx="0">
+              <a:schemeClr val="accent1"/>
+            </a:fillRef>
+            <a:effectRef idx="1">
+              <a:schemeClr val="accent1"/>
+            </a:effectRef>
+            <a:fontRef idx="minor">
+              <a:schemeClr val="tx1"/>
+            </a:fontRef>
+          </p:style>
+        </p:cxnSp>
+        <p:cxnSp>
+          <p:nvCxnSpPr>
+            <p:cNvPr id="9" name="Straight Connector 8">
+              <a:extLst>
+                <a:ext uri="{FF2B5EF4-FFF2-40B4-BE49-F238E27FC236}">
+                  <a16:creationId xmlns:a16="http://schemas.microsoft.com/office/drawing/2014/main" id="{5BCD8CBC-9D31-AC12-8F28-BFBECD86BFFA}"/>
+                </a:ext>
+              </a:extLst>
+            </p:cNvPr>
+            <p:cNvCxnSpPr>
+              <a:cxnSpLocks/>
+            </p:cNvCxnSpPr>
+            <p:nvPr/>
+          </p:nvCxnSpPr>
+          <p:spPr>
+            <a:xfrm>
+              <a:off x="1967695" y="3467582"/>
+              <a:ext cx="5486400" cy="0"/>
+            </a:xfrm>
+            <a:prstGeom prst="line">
+              <a:avLst/>
+            </a:prstGeom>
+          </p:spPr>
+          <p:style>
+            <a:lnRef idx="2">
+              <a:schemeClr val="accent1"/>
+            </a:lnRef>
+            <a:fillRef idx="0">
+              <a:schemeClr val="accent1"/>
+            </a:fillRef>
+            <a:effectRef idx="1">
+              <a:schemeClr val="accent1"/>
+            </a:effectRef>
+            <a:fontRef idx="minor">
+              <a:schemeClr val="tx1"/>
+            </a:fontRef>
+          </p:style>
+        </p:cxnSp>
+        <p:cxnSp>
+          <p:nvCxnSpPr>
+            <p:cNvPr id="10" name="Straight Connector 9">
+              <a:extLst>
+                <a:ext uri="{FF2B5EF4-FFF2-40B4-BE49-F238E27FC236}">
+                  <a16:creationId xmlns:a16="http://schemas.microsoft.com/office/drawing/2014/main" id="{8787FE2D-C950-9B9E-702A-758594086B6A}"/>
+                </a:ext>
+              </a:extLst>
+            </p:cNvPr>
+            <p:cNvCxnSpPr>
+              <a:cxnSpLocks/>
+            </p:cNvCxnSpPr>
+            <p:nvPr/>
+          </p:nvCxnSpPr>
+          <p:spPr>
+            <a:xfrm>
+              <a:off x="1956120" y="4858473"/>
+              <a:ext cx="5486400" cy="0"/>
+            </a:xfrm>
+            <a:prstGeom prst="line">
+              <a:avLst/>
+            </a:prstGeom>
+          </p:spPr>
+          <p:style>
+            <a:lnRef idx="2">
+              <a:schemeClr val="accent1"/>
+            </a:lnRef>
+            <a:fillRef idx="0">
+              <a:schemeClr val="accent1"/>
+            </a:fillRef>
+            <a:effectRef idx="1">
+              <a:schemeClr val="accent1"/>
+            </a:effectRef>
+            <a:fontRef idx="minor">
+              <a:schemeClr val="tx1"/>
+            </a:fontRef>
+          </p:style>
+        </p:cxnSp>
+        <p:cxnSp>
+          <p:nvCxnSpPr>
+            <p:cNvPr id="12" name="Straight Connector 11">
+              <a:extLst>
+                <a:ext uri="{FF2B5EF4-FFF2-40B4-BE49-F238E27FC236}">
+                  <a16:creationId xmlns:a16="http://schemas.microsoft.com/office/drawing/2014/main" id="{75F4877D-356F-7602-28FC-0259FE849F60}"/>
+                </a:ext>
+              </a:extLst>
+            </p:cNvPr>
+            <p:cNvCxnSpPr>
+              <a:cxnSpLocks/>
+            </p:cNvCxnSpPr>
+            <p:nvPr/>
+          </p:nvCxnSpPr>
+          <p:spPr>
+            <a:xfrm>
+              <a:off x="2743200" y="416689"/>
+              <a:ext cx="0" cy="5798916"/>
+            </a:xfrm>
+            <a:prstGeom prst="line">
+              <a:avLst/>
+            </a:prstGeom>
+          </p:spPr>
+          <p:style>
+            <a:lnRef idx="2">
+              <a:schemeClr val="accent1"/>
+            </a:lnRef>
+            <a:fillRef idx="0">
+              <a:schemeClr val="accent1"/>
+            </a:fillRef>
+            <a:effectRef idx="1">
+              <a:schemeClr val="accent1"/>
+            </a:effectRef>
+            <a:fontRef idx="minor">
+              <a:schemeClr val="tx1"/>
+            </a:fontRef>
+          </p:style>
+        </p:cxnSp>
+        <p:cxnSp>
+          <p:nvCxnSpPr>
+            <p:cNvPr id="15" name="Straight Connector 14">
+              <a:extLst>
+                <a:ext uri="{FF2B5EF4-FFF2-40B4-BE49-F238E27FC236}">
+                  <a16:creationId xmlns:a16="http://schemas.microsoft.com/office/drawing/2014/main" id="{D57539FB-F360-7FA5-0B2A-BDA3A702E3A4}"/>
+                </a:ext>
+              </a:extLst>
+            </p:cNvPr>
+            <p:cNvCxnSpPr>
+              <a:cxnSpLocks/>
+            </p:cNvCxnSpPr>
+            <p:nvPr/>
+          </p:nvCxnSpPr>
+          <p:spPr>
+            <a:xfrm>
+              <a:off x="3520635" y="418616"/>
+              <a:ext cx="0" cy="5798916"/>
+            </a:xfrm>
+            <a:prstGeom prst="line">
+              <a:avLst/>
+            </a:prstGeom>
+          </p:spPr>
+          <p:style>
+            <a:lnRef idx="2">
+              <a:schemeClr val="accent1"/>
+            </a:lnRef>
+            <a:fillRef idx="0">
+              <a:schemeClr val="accent1"/>
+            </a:fillRef>
+            <a:effectRef idx="1">
+              <a:schemeClr val="accent1"/>
+            </a:effectRef>
+            <a:fontRef idx="minor">
+              <a:schemeClr val="tx1"/>
+            </a:fontRef>
+          </p:style>
+        </p:cxnSp>
+        <p:cxnSp>
+          <p:nvCxnSpPr>
+            <p:cNvPr id="16" name="Straight Connector 15">
+              <a:extLst>
+                <a:ext uri="{FF2B5EF4-FFF2-40B4-BE49-F238E27FC236}">
+                  <a16:creationId xmlns:a16="http://schemas.microsoft.com/office/drawing/2014/main" id="{BA09788F-F2A4-9101-A9EE-022FBE3A2B07}"/>
+                </a:ext>
+              </a:extLst>
+            </p:cNvPr>
+            <p:cNvCxnSpPr>
+              <a:cxnSpLocks/>
+            </p:cNvCxnSpPr>
+            <p:nvPr/>
+          </p:nvCxnSpPr>
+          <p:spPr>
+            <a:xfrm>
+              <a:off x="4298075" y="420541"/>
+              <a:ext cx="0" cy="5798916"/>
+            </a:xfrm>
+            <a:prstGeom prst="line">
+              <a:avLst/>
+            </a:prstGeom>
+          </p:spPr>
+          <p:style>
+            <a:lnRef idx="2">
+              <a:schemeClr val="accent1"/>
+            </a:lnRef>
+            <a:fillRef idx="0">
+              <a:schemeClr val="accent1"/>
+            </a:fillRef>
+            <a:effectRef idx="1">
+              <a:schemeClr val="accent1"/>
+            </a:effectRef>
+            <a:fontRef idx="minor">
+              <a:schemeClr val="tx1"/>
+            </a:fontRef>
+          </p:style>
+        </p:cxnSp>
+        <p:cxnSp>
+          <p:nvCxnSpPr>
+            <p:cNvPr id="17" name="Straight Connector 16">
+              <a:extLst>
+                <a:ext uri="{FF2B5EF4-FFF2-40B4-BE49-F238E27FC236}">
+                  <a16:creationId xmlns:a16="http://schemas.microsoft.com/office/drawing/2014/main" id="{D6CB5166-52BA-F849-367B-99D0D2640298}"/>
+                </a:ext>
+              </a:extLst>
+            </p:cNvPr>
+            <p:cNvCxnSpPr>
+              <a:cxnSpLocks/>
+            </p:cNvCxnSpPr>
+            <p:nvPr/>
+          </p:nvCxnSpPr>
+          <p:spPr>
+            <a:xfrm>
+              <a:off x="5063933" y="422468"/>
+              <a:ext cx="0" cy="5798916"/>
+            </a:xfrm>
+            <a:prstGeom prst="line">
+              <a:avLst/>
+            </a:prstGeom>
+          </p:spPr>
+          <p:style>
+            <a:lnRef idx="2">
+              <a:schemeClr val="accent1"/>
+            </a:lnRef>
+            <a:fillRef idx="0">
+              <a:schemeClr val="accent1"/>
+            </a:fillRef>
+            <a:effectRef idx="1">
+              <a:schemeClr val="accent1"/>
+            </a:effectRef>
+            <a:fontRef idx="minor">
+              <a:schemeClr val="tx1"/>
+            </a:fontRef>
+          </p:style>
+        </p:cxnSp>
+        <p:cxnSp>
+          <p:nvCxnSpPr>
+            <p:cNvPr id="18" name="Straight Connector 17">
+              <a:extLst>
+                <a:ext uri="{FF2B5EF4-FFF2-40B4-BE49-F238E27FC236}">
+                  <a16:creationId xmlns:a16="http://schemas.microsoft.com/office/drawing/2014/main" id="{E49E559D-B37E-CCEF-90F8-509A952EA5CC}"/>
+                </a:ext>
+              </a:extLst>
+            </p:cNvPr>
+            <p:cNvCxnSpPr>
+              <a:cxnSpLocks/>
+            </p:cNvCxnSpPr>
+            <p:nvPr/>
+          </p:nvCxnSpPr>
+          <p:spPr>
+            <a:xfrm>
+              <a:off x="5818220" y="412818"/>
+              <a:ext cx="0" cy="5798916"/>
+            </a:xfrm>
+            <a:prstGeom prst="line">
+              <a:avLst/>
+            </a:prstGeom>
+          </p:spPr>
+          <p:style>
+            <a:lnRef idx="2">
+              <a:schemeClr val="accent1"/>
+            </a:lnRef>
+            <a:fillRef idx="0">
+              <a:schemeClr val="accent1"/>
+            </a:fillRef>
+            <a:effectRef idx="1">
+              <a:schemeClr val="accent1"/>
+            </a:effectRef>
+            <a:fontRef idx="minor">
+              <a:schemeClr val="tx1"/>
+            </a:fontRef>
+          </p:style>
+        </p:cxnSp>
+        <p:cxnSp>
+          <p:nvCxnSpPr>
+            <p:cNvPr id="19" name="Straight Connector 18">
+              <a:extLst>
+                <a:ext uri="{FF2B5EF4-FFF2-40B4-BE49-F238E27FC236}">
+                  <a16:creationId xmlns:a16="http://schemas.microsoft.com/office/drawing/2014/main" id="{71BADB5B-E05D-3D47-15BA-E97DE2D64787}"/>
+                </a:ext>
+              </a:extLst>
+            </p:cNvPr>
+            <p:cNvCxnSpPr>
+              <a:cxnSpLocks/>
+            </p:cNvCxnSpPr>
+            <p:nvPr/>
+          </p:nvCxnSpPr>
+          <p:spPr>
+            <a:xfrm>
+              <a:off x="6584078" y="426318"/>
+              <a:ext cx="0" cy="5798916"/>
+            </a:xfrm>
+            <a:prstGeom prst="line">
+              <a:avLst/>
+            </a:prstGeom>
+          </p:spPr>
+          <p:style>
+            <a:lnRef idx="2">
+              <a:schemeClr val="accent1"/>
+            </a:lnRef>
+            <a:fillRef idx="0">
+              <a:schemeClr val="accent1"/>
+            </a:fillRef>
+            <a:effectRef idx="1">
+              <a:schemeClr val="accent1"/>
+            </a:effectRef>
+            <a:fontRef idx="minor">
+              <a:schemeClr val="tx1"/>
+            </a:fontRef>
+          </p:style>
+        </p:cxnSp>
+        <p:grpSp>
+          <p:nvGrpSpPr>
+            <p:cNvPr id="25" name="Group 24">
+              <a:extLst>
+                <a:ext uri="{FF2B5EF4-FFF2-40B4-BE49-F238E27FC236}">
+                  <a16:creationId xmlns:a16="http://schemas.microsoft.com/office/drawing/2014/main" id="{CB42B50F-E0DC-99AC-F281-AE4400420ABF}"/>
+                </a:ext>
+              </a:extLst>
+            </p:cNvPr>
+            <p:cNvGrpSpPr/>
+            <p:nvPr/>
+          </p:nvGrpSpPr>
+          <p:grpSpPr>
+            <a:xfrm>
+              <a:off x="1474112" y="509815"/>
+              <a:ext cx="513282" cy="5838370"/>
+              <a:chOff x="964827" y="509815"/>
+              <a:chExt cx="513282" cy="5838370"/>
+            </a:xfrm>
+          </p:grpSpPr>
+          <p:sp>
+            <p:nvSpPr>
+              <p:cNvPr id="20" name="TextBox 19">
+                <a:extLst>
+                  <a:ext uri="{FF2B5EF4-FFF2-40B4-BE49-F238E27FC236}">
+                    <a16:creationId xmlns:a16="http://schemas.microsoft.com/office/drawing/2014/main" id="{9A0E5526-9B75-B99F-9D94-6BC8D05D41A8}"/>
+                  </a:ext>
+                </a:extLst>
+              </p:cNvPr>
+              <p:cNvSpPr txBox="1"/>
+              <p:nvPr/>
+            </p:nvSpPr>
+            <p:spPr>
+              <a:xfrm>
+                <a:off x="964827" y="509815"/>
+                <a:ext cx="513282" cy="369332"/>
+              </a:xfrm>
+              <a:prstGeom prst="rect">
+                <a:avLst/>
+              </a:prstGeom>
+              <a:noFill/>
+            </p:spPr>
+            <p:txBody>
+              <a:bodyPr wrap="none" rtlCol="0">
+                <a:spAutoFit/>
+              </a:bodyPr>
+              <a:lstStyle/>
+              <a:p>
+                <a:r>
+                  <a:rPr lang="en-NL" dirty="0"/>
+                  <a:t>10</a:t>
+                </a:r>
+                <a:r>
+                  <a:rPr lang="en-NL" baseline="30000" dirty="0"/>
+                  <a:t>4</a:t>
+                </a:r>
+                <a:endParaRPr lang="en-NL" dirty="0"/>
+              </a:p>
+            </p:txBody>
+          </p:sp>
+          <p:sp>
+            <p:nvSpPr>
+              <p:cNvPr id="21" name="TextBox 20">
+                <a:extLst>
+                  <a:ext uri="{FF2B5EF4-FFF2-40B4-BE49-F238E27FC236}">
+                    <a16:creationId xmlns:a16="http://schemas.microsoft.com/office/drawing/2014/main" id="{79F48870-73EE-8006-53BC-B221C234437D}"/>
+                  </a:ext>
+                </a:extLst>
+              </p:cNvPr>
+              <p:cNvSpPr txBox="1"/>
+              <p:nvPr/>
+            </p:nvSpPr>
+            <p:spPr>
+              <a:xfrm>
+                <a:off x="964827" y="1877075"/>
+                <a:ext cx="513282" cy="369332"/>
+              </a:xfrm>
+              <a:prstGeom prst="rect">
+                <a:avLst/>
+              </a:prstGeom>
+              <a:noFill/>
+            </p:spPr>
+            <p:txBody>
+              <a:bodyPr wrap="none" rtlCol="0">
+                <a:spAutoFit/>
+              </a:bodyPr>
+              <a:lstStyle/>
+              <a:p>
+                <a:r>
+                  <a:rPr lang="en-NL" dirty="0"/>
+                  <a:t>10</a:t>
+                </a:r>
+                <a:r>
+                  <a:rPr lang="en-NL" baseline="30000" dirty="0"/>
+                  <a:t>3</a:t>
+                </a:r>
+                <a:endParaRPr lang="en-NL" dirty="0"/>
+              </a:p>
+            </p:txBody>
+          </p:sp>
+          <p:sp>
+            <p:nvSpPr>
+              <p:cNvPr id="22" name="TextBox 21">
+                <a:extLst>
+                  <a:ext uri="{FF2B5EF4-FFF2-40B4-BE49-F238E27FC236}">
+                    <a16:creationId xmlns:a16="http://schemas.microsoft.com/office/drawing/2014/main" id="{38BA1C5C-C406-DCC9-188E-556B5AC62490}"/>
+                  </a:ext>
+                </a:extLst>
+              </p:cNvPr>
+              <p:cNvSpPr txBox="1"/>
+              <p:nvPr/>
+            </p:nvSpPr>
+            <p:spPr>
+              <a:xfrm>
+                <a:off x="964827" y="3244334"/>
+                <a:ext cx="513282" cy="369332"/>
+              </a:xfrm>
+              <a:prstGeom prst="rect">
+                <a:avLst/>
+              </a:prstGeom>
+              <a:noFill/>
+            </p:spPr>
+            <p:txBody>
+              <a:bodyPr wrap="none" rtlCol="0">
+                <a:spAutoFit/>
+              </a:bodyPr>
+              <a:lstStyle/>
+              <a:p>
+                <a:r>
+                  <a:rPr lang="en-NL" dirty="0"/>
+                  <a:t>10</a:t>
+                </a:r>
+                <a:r>
+                  <a:rPr lang="en-NL" baseline="30000" dirty="0"/>
+                  <a:t>2</a:t>
+                </a:r>
+                <a:endParaRPr lang="en-NL" dirty="0"/>
+              </a:p>
+            </p:txBody>
+          </p:sp>
+          <p:sp>
+            <p:nvSpPr>
+              <p:cNvPr id="23" name="TextBox 22">
+                <a:extLst>
+                  <a:ext uri="{FF2B5EF4-FFF2-40B4-BE49-F238E27FC236}">
+                    <a16:creationId xmlns:a16="http://schemas.microsoft.com/office/drawing/2014/main" id="{64BC7382-CE75-E7B3-D301-982242FFE71E}"/>
+                  </a:ext>
+                </a:extLst>
+              </p:cNvPr>
+              <p:cNvSpPr txBox="1"/>
+              <p:nvPr/>
+            </p:nvSpPr>
+            <p:spPr>
+              <a:xfrm>
+                <a:off x="964827" y="4611593"/>
+                <a:ext cx="513282" cy="369332"/>
+              </a:xfrm>
+              <a:prstGeom prst="rect">
+                <a:avLst/>
+              </a:prstGeom>
+              <a:noFill/>
+            </p:spPr>
+            <p:txBody>
+              <a:bodyPr wrap="none" rtlCol="0">
+                <a:spAutoFit/>
+              </a:bodyPr>
+              <a:lstStyle/>
+              <a:p>
+                <a:r>
+                  <a:rPr lang="en-NL" dirty="0"/>
+                  <a:t>10</a:t>
+                </a:r>
+                <a:r>
+                  <a:rPr lang="en-NL" baseline="30000" dirty="0"/>
+                  <a:t>1</a:t>
+                </a:r>
+                <a:endParaRPr lang="en-NL" dirty="0"/>
+              </a:p>
+            </p:txBody>
+          </p:sp>
+          <p:sp>
+            <p:nvSpPr>
+              <p:cNvPr id="24" name="TextBox 23">
+                <a:extLst>
+                  <a:ext uri="{FF2B5EF4-FFF2-40B4-BE49-F238E27FC236}">
+                    <a16:creationId xmlns:a16="http://schemas.microsoft.com/office/drawing/2014/main" id="{061826C3-24BC-C03B-2620-5DAA4BA479DD}"/>
+                  </a:ext>
+                </a:extLst>
+              </p:cNvPr>
+              <p:cNvSpPr txBox="1"/>
+              <p:nvPr/>
+            </p:nvSpPr>
+            <p:spPr>
+              <a:xfrm>
+                <a:off x="964827" y="5978853"/>
+                <a:ext cx="513282" cy="369332"/>
+              </a:xfrm>
+              <a:prstGeom prst="rect">
+                <a:avLst/>
+              </a:prstGeom>
+              <a:noFill/>
+            </p:spPr>
+            <p:txBody>
+              <a:bodyPr wrap="none" rtlCol="0">
+                <a:spAutoFit/>
+              </a:bodyPr>
+              <a:lstStyle/>
+              <a:p>
+                <a:r>
+                  <a:rPr lang="en-NL" dirty="0"/>
+                  <a:t>10</a:t>
+                </a:r>
+                <a:r>
+                  <a:rPr lang="en-NL" baseline="30000" dirty="0"/>
+                  <a:t>0</a:t>
+                </a:r>
+                <a:endParaRPr lang="en-NL" dirty="0"/>
+              </a:p>
+            </p:txBody>
+          </p:sp>
+        </p:grpSp>
+        <p:grpSp>
+          <p:nvGrpSpPr>
+            <p:cNvPr id="26" name="Group 25">
+              <a:extLst>
+                <a:ext uri="{FF2B5EF4-FFF2-40B4-BE49-F238E27FC236}">
+                  <a16:creationId xmlns:a16="http://schemas.microsoft.com/office/drawing/2014/main" id="{A9817A38-5314-854B-80A8-4EA1B699F6F7}"/>
+                </a:ext>
+              </a:extLst>
+            </p:cNvPr>
+            <p:cNvGrpSpPr/>
+            <p:nvPr/>
+          </p:nvGrpSpPr>
+          <p:grpSpPr>
+            <a:xfrm>
+              <a:off x="7528319" y="464435"/>
+              <a:ext cx="308098" cy="5838370"/>
+              <a:chOff x="964827" y="509815"/>
+              <a:chExt cx="308098" cy="5838370"/>
+            </a:xfrm>
+          </p:grpSpPr>
+          <p:sp>
+            <p:nvSpPr>
+              <p:cNvPr id="27" name="TextBox 26">
+                <a:extLst>
+                  <a:ext uri="{FF2B5EF4-FFF2-40B4-BE49-F238E27FC236}">
+                    <a16:creationId xmlns:a16="http://schemas.microsoft.com/office/drawing/2014/main" id="{BF05CECD-54E5-6159-F6D9-A0A1D22A5406}"/>
+                  </a:ext>
+                </a:extLst>
+              </p:cNvPr>
+              <p:cNvSpPr txBox="1"/>
+              <p:nvPr/>
+            </p:nvSpPr>
+            <p:spPr>
+              <a:xfrm>
+                <a:off x="964827" y="509815"/>
+                <a:ext cx="308098" cy="369332"/>
+              </a:xfrm>
+              <a:prstGeom prst="rect">
+                <a:avLst/>
+              </a:prstGeom>
+              <a:noFill/>
+            </p:spPr>
+            <p:txBody>
+              <a:bodyPr wrap="none" rtlCol="0">
+                <a:spAutoFit/>
+              </a:bodyPr>
+              <a:lstStyle/>
+              <a:p>
+                <a:r>
+                  <a:rPr lang="en-NL" dirty="0"/>
+                  <a:t>4</a:t>
+                </a:r>
+              </a:p>
+            </p:txBody>
+          </p:sp>
+          <p:sp>
+            <p:nvSpPr>
+              <p:cNvPr id="28" name="TextBox 27">
+                <a:extLst>
+                  <a:ext uri="{FF2B5EF4-FFF2-40B4-BE49-F238E27FC236}">
+                    <a16:creationId xmlns:a16="http://schemas.microsoft.com/office/drawing/2014/main" id="{09A11FDA-186B-F9AB-8F05-E1741F4254DF}"/>
+                  </a:ext>
+                </a:extLst>
+              </p:cNvPr>
+              <p:cNvSpPr txBox="1"/>
+              <p:nvPr/>
+            </p:nvSpPr>
+            <p:spPr>
+              <a:xfrm>
+                <a:off x="964827" y="1877075"/>
+                <a:ext cx="308098" cy="369332"/>
+              </a:xfrm>
+              <a:prstGeom prst="rect">
+                <a:avLst/>
+              </a:prstGeom>
+              <a:noFill/>
+            </p:spPr>
+            <p:txBody>
+              <a:bodyPr wrap="none" rtlCol="0">
+                <a:spAutoFit/>
+              </a:bodyPr>
+              <a:lstStyle/>
+              <a:p>
+                <a:r>
+                  <a:rPr lang="en-NL" dirty="0"/>
+                  <a:t>3</a:t>
+                </a:r>
+              </a:p>
+            </p:txBody>
+          </p:sp>
+          <p:sp>
+            <p:nvSpPr>
+              <p:cNvPr id="29" name="TextBox 28">
+                <a:extLst>
+                  <a:ext uri="{FF2B5EF4-FFF2-40B4-BE49-F238E27FC236}">
+                    <a16:creationId xmlns:a16="http://schemas.microsoft.com/office/drawing/2014/main" id="{13C000CD-5CB5-0DCC-7B5B-830FAE30AE87}"/>
+                  </a:ext>
+                </a:extLst>
+              </p:cNvPr>
+              <p:cNvSpPr txBox="1"/>
+              <p:nvPr/>
+            </p:nvSpPr>
+            <p:spPr>
+              <a:xfrm>
+                <a:off x="964827" y="3244334"/>
+                <a:ext cx="308098" cy="369332"/>
+              </a:xfrm>
+              <a:prstGeom prst="rect">
+                <a:avLst/>
+              </a:prstGeom>
+              <a:noFill/>
+            </p:spPr>
+            <p:txBody>
+              <a:bodyPr wrap="none" rtlCol="0">
+                <a:spAutoFit/>
+              </a:bodyPr>
+              <a:lstStyle/>
+              <a:p>
+                <a:r>
+                  <a:rPr lang="en-NL" dirty="0"/>
+                  <a:t>2</a:t>
+                </a:r>
+              </a:p>
+            </p:txBody>
+          </p:sp>
+          <p:sp>
+            <p:nvSpPr>
+              <p:cNvPr id="30" name="TextBox 29">
+                <a:extLst>
+                  <a:ext uri="{FF2B5EF4-FFF2-40B4-BE49-F238E27FC236}">
+                    <a16:creationId xmlns:a16="http://schemas.microsoft.com/office/drawing/2014/main" id="{CFE80307-ECCD-FEB2-8F8B-33219FB36D1C}"/>
+                  </a:ext>
+                </a:extLst>
+              </p:cNvPr>
+              <p:cNvSpPr txBox="1"/>
+              <p:nvPr/>
+            </p:nvSpPr>
+            <p:spPr>
+              <a:xfrm>
+                <a:off x="964827" y="4611593"/>
+                <a:ext cx="308098" cy="369332"/>
+              </a:xfrm>
+              <a:prstGeom prst="rect">
+                <a:avLst/>
+              </a:prstGeom>
+              <a:noFill/>
+            </p:spPr>
+            <p:txBody>
+              <a:bodyPr wrap="none" rtlCol="0">
+                <a:spAutoFit/>
+              </a:bodyPr>
+              <a:lstStyle/>
+              <a:p>
+                <a:r>
+                  <a:rPr lang="en-NL" dirty="0"/>
+                  <a:t>1</a:t>
+                </a:r>
+              </a:p>
+            </p:txBody>
+          </p:sp>
+          <p:sp>
+            <p:nvSpPr>
+              <p:cNvPr id="31" name="TextBox 30">
+                <a:extLst>
+                  <a:ext uri="{FF2B5EF4-FFF2-40B4-BE49-F238E27FC236}">
+                    <a16:creationId xmlns:a16="http://schemas.microsoft.com/office/drawing/2014/main" id="{A384A089-F596-1DAE-8B1E-F35EE386ABC6}"/>
+                  </a:ext>
+                </a:extLst>
+              </p:cNvPr>
+              <p:cNvSpPr txBox="1"/>
+              <p:nvPr/>
+            </p:nvSpPr>
+            <p:spPr>
+              <a:xfrm>
+                <a:off x="964827" y="5978853"/>
+                <a:ext cx="308098" cy="369332"/>
+              </a:xfrm>
+              <a:prstGeom prst="rect">
+                <a:avLst/>
+              </a:prstGeom>
+              <a:noFill/>
+            </p:spPr>
+            <p:txBody>
+              <a:bodyPr wrap="none" rtlCol="0">
+                <a:spAutoFit/>
+              </a:bodyPr>
+              <a:lstStyle/>
+              <a:p>
+                <a:r>
+                  <a:rPr lang="en-NL" dirty="0"/>
+                  <a:t>0</a:t>
+                </a:r>
+              </a:p>
+            </p:txBody>
+          </p:sp>
+        </p:grpSp>
+        <p:sp>
+          <p:nvSpPr>
+            <p:cNvPr id="32" name="TextBox 31">
+              <a:extLst>
+                <a:ext uri="{FF2B5EF4-FFF2-40B4-BE49-F238E27FC236}">
+                  <a16:creationId xmlns:a16="http://schemas.microsoft.com/office/drawing/2014/main" id="{338727A4-DB26-1F0A-397D-16AC3075A773}"/>
+                </a:ext>
+              </a:extLst>
+            </p:cNvPr>
+            <p:cNvSpPr txBox="1"/>
+            <p:nvPr/>
+          </p:nvSpPr>
+          <p:spPr>
+            <a:xfrm>
+              <a:off x="2322190" y="6304966"/>
+              <a:ext cx="620683" cy="369332"/>
+            </a:xfrm>
+            <a:prstGeom prst="rect">
+              <a:avLst/>
+            </a:prstGeom>
+            <a:noFill/>
+          </p:spPr>
+          <p:txBody>
+            <a:bodyPr wrap="none" rtlCol="0">
+              <a:spAutoFit/>
+            </a:bodyPr>
+            <a:lstStyle/>
+            <a:p>
+              <a:r>
+                <a:rPr lang="en-NL" dirty="0"/>
+                <a:t>0.05</a:t>
+              </a:r>
+            </a:p>
+          </p:txBody>
+        </p:sp>
+        <p:sp>
+          <p:nvSpPr>
+            <p:cNvPr id="33" name="TextBox 32">
+              <a:extLst>
+                <a:ext uri="{FF2B5EF4-FFF2-40B4-BE49-F238E27FC236}">
+                  <a16:creationId xmlns:a16="http://schemas.microsoft.com/office/drawing/2014/main" id="{B0E4A0C0-E9DD-51D4-6D0D-71F4DC3AED88}"/>
+                </a:ext>
+              </a:extLst>
+            </p:cNvPr>
+            <p:cNvSpPr txBox="1"/>
+            <p:nvPr/>
+          </p:nvSpPr>
+          <p:spPr>
+            <a:xfrm>
+              <a:off x="3893588" y="6304966"/>
+              <a:ext cx="620683" cy="369332"/>
+            </a:xfrm>
+            <a:prstGeom prst="rect">
+              <a:avLst/>
+            </a:prstGeom>
+            <a:noFill/>
+          </p:spPr>
+          <p:txBody>
+            <a:bodyPr wrap="none" rtlCol="0">
+              <a:spAutoFit/>
+            </a:bodyPr>
+            <a:lstStyle/>
+            <a:p>
+              <a:r>
+                <a:rPr lang="en-NL" dirty="0"/>
+                <a:t>0.15</a:t>
+              </a:r>
+            </a:p>
+          </p:txBody>
+        </p:sp>
+        <p:sp>
+          <p:nvSpPr>
+            <p:cNvPr id="34" name="TextBox 33">
+              <a:extLst>
+                <a:ext uri="{FF2B5EF4-FFF2-40B4-BE49-F238E27FC236}">
+                  <a16:creationId xmlns:a16="http://schemas.microsoft.com/office/drawing/2014/main" id="{F7EB1FF4-E40C-B2FA-7F15-E312BED5B66F}"/>
+                </a:ext>
+              </a:extLst>
+            </p:cNvPr>
+            <p:cNvSpPr txBox="1"/>
+            <p:nvPr/>
+          </p:nvSpPr>
+          <p:spPr>
+            <a:xfrm>
+              <a:off x="5464986" y="6304966"/>
+              <a:ext cx="620683" cy="369332"/>
+            </a:xfrm>
+            <a:prstGeom prst="rect">
+              <a:avLst/>
+            </a:prstGeom>
+            <a:noFill/>
+          </p:spPr>
+          <p:txBody>
+            <a:bodyPr wrap="none" rtlCol="0">
+              <a:spAutoFit/>
+            </a:bodyPr>
+            <a:lstStyle/>
+            <a:p>
+              <a:r>
+                <a:rPr lang="en-NL" dirty="0"/>
+                <a:t>0.25</a:t>
+              </a:r>
+            </a:p>
+          </p:txBody>
+        </p:sp>
+        <p:sp>
+          <p:nvSpPr>
+            <p:cNvPr id="35" name="TextBox 34">
+              <a:extLst>
+                <a:ext uri="{FF2B5EF4-FFF2-40B4-BE49-F238E27FC236}">
+                  <a16:creationId xmlns:a16="http://schemas.microsoft.com/office/drawing/2014/main" id="{2C9FB92F-AAEA-146D-DEF5-9D55339192D9}"/>
+                </a:ext>
+              </a:extLst>
+            </p:cNvPr>
+            <p:cNvSpPr txBox="1"/>
+            <p:nvPr/>
+          </p:nvSpPr>
+          <p:spPr>
+            <a:xfrm>
+              <a:off x="7036384" y="6304966"/>
+              <a:ext cx="620683" cy="369332"/>
+            </a:xfrm>
+            <a:prstGeom prst="rect">
+              <a:avLst/>
+            </a:prstGeom>
+            <a:noFill/>
+          </p:spPr>
+          <p:txBody>
+            <a:bodyPr wrap="none" rtlCol="0">
+              <a:spAutoFit/>
+            </a:bodyPr>
+            <a:lstStyle/>
+            <a:p>
+              <a:r>
+                <a:rPr lang="en-NL" dirty="0"/>
+                <a:t>0.35</a:t>
+              </a:r>
+            </a:p>
+          </p:txBody>
+        </p:sp>
+        <p:sp>
+          <p:nvSpPr>
+            <p:cNvPr id="36" name="TextBox 35">
+              <a:extLst>
+                <a:ext uri="{FF2B5EF4-FFF2-40B4-BE49-F238E27FC236}">
+                  <a16:creationId xmlns:a16="http://schemas.microsoft.com/office/drawing/2014/main" id="{13017CBF-0799-DEBF-51EB-249872509ECC}"/>
+                </a:ext>
+              </a:extLst>
+            </p:cNvPr>
+            <p:cNvSpPr txBox="1"/>
+            <p:nvPr/>
+          </p:nvSpPr>
+          <p:spPr>
+            <a:xfrm>
+              <a:off x="3107889" y="6304966"/>
+              <a:ext cx="620683" cy="369332"/>
+            </a:xfrm>
+            <a:prstGeom prst="rect">
+              <a:avLst/>
+            </a:prstGeom>
+            <a:noFill/>
+          </p:spPr>
+          <p:txBody>
+            <a:bodyPr wrap="none" rtlCol="0">
+              <a:spAutoFit/>
+            </a:bodyPr>
+            <a:lstStyle/>
+            <a:p>
+              <a:r>
+                <a:rPr lang="en-NL" dirty="0"/>
+                <a:t>0.10</a:t>
+              </a:r>
+            </a:p>
+          </p:txBody>
+        </p:sp>
+        <p:sp>
+          <p:nvSpPr>
+            <p:cNvPr id="37" name="TextBox 36">
+              <a:extLst>
+                <a:ext uri="{FF2B5EF4-FFF2-40B4-BE49-F238E27FC236}">
+                  <a16:creationId xmlns:a16="http://schemas.microsoft.com/office/drawing/2014/main" id="{3C8111A6-A28A-80AB-7CE7-47E9132A0629}"/>
+                </a:ext>
+              </a:extLst>
+            </p:cNvPr>
+            <p:cNvSpPr txBox="1"/>
+            <p:nvPr/>
+          </p:nvSpPr>
+          <p:spPr>
+            <a:xfrm>
+              <a:off x="4679287" y="6304966"/>
+              <a:ext cx="620683" cy="369332"/>
+            </a:xfrm>
+            <a:prstGeom prst="rect">
+              <a:avLst/>
+            </a:prstGeom>
+            <a:noFill/>
+          </p:spPr>
+          <p:txBody>
+            <a:bodyPr wrap="none" rtlCol="0">
+              <a:spAutoFit/>
+            </a:bodyPr>
+            <a:lstStyle/>
+            <a:p>
+              <a:r>
+                <a:rPr lang="en-NL" dirty="0"/>
+                <a:t>0.20</a:t>
+              </a:r>
+            </a:p>
+          </p:txBody>
+        </p:sp>
+        <p:sp>
+          <p:nvSpPr>
+            <p:cNvPr id="38" name="TextBox 37">
+              <a:extLst>
+                <a:ext uri="{FF2B5EF4-FFF2-40B4-BE49-F238E27FC236}">
+                  <a16:creationId xmlns:a16="http://schemas.microsoft.com/office/drawing/2014/main" id="{67DB243B-5CF1-DE19-88CF-48B18EF870FF}"/>
+                </a:ext>
+              </a:extLst>
+            </p:cNvPr>
+            <p:cNvSpPr txBox="1"/>
+            <p:nvPr/>
+          </p:nvSpPr>
+          <p:spPr>
+            <a:xfrm>
+              <a:off x="6250685" y="6304966"/>
+              <a:ext cx="620683" cy="369332"/>
+            </a:xfrm>
+            <a:prstGeom prst="rect">
+              <a:avLst/>
+            </a:prstGeom>
+            <a:noFill/>
+          </p:spPr>
+          <p:txBody>
+            <a:bodyPr wrap="none" rtlCol="0">
+              <a:spAutoFit/>
+            </a:bodyPr>
+            <a:lstStyle/>
+            <a:p>
+              <a:r>
+                <a:rPr lang="en-NL" dirty="0"/>
+                <a:t>0.30</a:t>
+              </a:r>
+            </a:p>
+          </p:txBody>
+        </p:sp>
+        <p:sp>
+          <p:nvSpPr>
+            <p:cNvPr id="39" name="TextBox 38">
+              <a:extLst>
+                <a:ext uri="{FF2B5EF4-FFF2-40B4-BE49-F238E27FC236}">
+                  <a16:creationId xmlns:a16="http://schemas.microsoft.com/office/drawing/2014/main" id="{C812CD5F-3136-7CD6-F625-232C2BEF55D4}"/>
+                </a:ext>
+              </a:extLst>
+            </p:cNvPr>
+            <p:cNvSpPr txBox="1"/>
+            <p:nvPr/>
+          </p:nvSpPr>
+          <p:spPr>
+            <a:xfrm>
+              <a:off x="1849076" y="6304966"/>
+              <a:ext cx="308098" cy="369332"/>
+            </a:xfrm>
+            <a:prstGeom prst="rect">
+              <a:avLst/>
+            </a:prstGeom>
+            <a:noFill/>
+          </p:spPr>
+          <p:txBody>
+            <a:bodyPr wrap="none" rtlCol="0">
+              <a:spAutoFit/>
+            </a:bodyPr>
+            <a:lstStyle/>
+            <a:p>
+              <a:r>
+                <a:rPr lang="en-NL" dirty="0"/>
+                <a:t>0</a:t>
+              </a:r>
+            </a:p>
+          </p:txBody>
+        </p:sp>
+        <p:sp>
+          <p:nvSpPr>
+            <p:cNvPr id="40" name="TextBox 39">
+              <a:extLst>
+                <a:ext uri="{FF2B5EF4-FFF2-40B4-BE49-F238E27FC236}">
+                  <a16:creationId xmlns:a16="http://schemas.microsoft.com/office/drawing/2014/main" id="{8D20FD65-759C-27B0-3940-0399BE23D4C2}"/>
+                </a:ext>
+              </a:extLst>
+            </p:cNvPr>
+            <p:cNvSpPr txBox="1"/>
+            <p:nvPr/>
+          </p:nvSpPr>
+          <p:spPr>
+            <a:xfrm>
+              <a:off x="7246030" y="3505"/>
+              <a:ext cx="436338" cy="369332"/>
+            </a:xfrm>
+            <a:prstGeom prst="rect">
+              <a:avLst/>
+            </a:prstGeom>
+            <a:noFill/>
+          </p:spPr>
+          <p:txBody>
+            <a:bodyPr wrap="none" rtlCol="0">
+              <a:spAutoFit/>
+            </a:bodyPr>
+            <a:lstStyle/>
+            <a:p>
+              <a:r>
+                <a:rPr lang="en-NL" dirty="0"/>
+                <a:t>pF</a:t>
+              </a:r>
+            </a:p>
+          </p:txBody>
+        </p:sp>
+        <p:sp>
+          <p:nvSpPr>
+            <p:cNvPr id="41" name="TextBox 40">
+              <a:extLst>
+                <a:ext uri="{FF2B5EF4-FFF2-40B4-BE49-F238E27FC236}">
+                  <a16:creationId xmlns:a16="http://schemas.microsoft.com/office/drawing/2014/main" id="{6E4D6EB3-A501-ED1F-52D0-C53E766C18BB}"/>
+                </a:ext>
+              </a:extLst>
+            </p:cNvPr>
+            <p:cNvSpPr txBox="1"/>
+            <p:nvPr/>
+          </p:nvSpPr>
+          <p:spPr>
+            <a:xfrm>
+              <a:off x="1301383" y="1587"/>
+              <a:ext cx="1055097" cy="369332"/>
+            </a:xfrm>
+            <a:prstGeom prst="rect">
+              <a:avLst/>
+            </a:prstGeom>
+            <a:noFill/>
+          </p:spPr>
+          <p:txBody>
+            <a:bodyPr wrap="none" rtlCol="0">
+              <a:spAutoFit/>
+            </a:bodyPr>
+            <a:lstStyle/>
+            <a:p>
+              <a:r>
+                <a:rPr lang="en-NL" dirty="0"/>
+                <a:t>-p[mbar]</a:t>
+              </a:r>
+            </a:p>
+          </p:txBody>
+        </p:sp>
+        <p:sp>
+          <p:nvSpPr>
+            <p:cNvPr id="42" name="TextBox 41">
+              <a:extLst>
+                <a:ext uri="{FF2B5EF4-FFF2-40B4-BE49-F238E27FC236}">
+                  <a16:creationId xmlns:a16="http://schemas.microsoft.com/office/drawing/2014/main" id="{03EF6950-65BC-CDE5-69AD-78C9B8129B04}"/>
+                </a:ext>
+              </a:extLst>
+            </p:cNvPr>
+            <p:cNvSpPr txBox="1"/>
+            <p:nvPr/>
+          </p:nvSpPr>
+          <p:spPr>
+            <a:xfrm>
+              <a:off x="7565314" y="6464824"/>
+              <a:ext cx="314510" cy="369332"/>
+            </a:xfrm>
+            <a:prstGeom prst="rect">
+              <a:avLst/>
+            </a:prstGeom>
+            <a:noFill/>
+          </p:spPr>
+          <p:txBody>
+            <a:bodyPr wrap="none" rtlCol="0">
+              <a:spAutoFit/>
+            </a:bodyPr>
+            <a:lstStyle/>
+            <a:p>
+              <a:r>
+                <a:rPr lang="en-NL" dirty="0"/>
+                <a:t>𝜃</a:t>
+              </a:r>
+            </a:p>
+          </p:txBody>
+        </p:sp>
+        <p:sp>
+          <p:nvSpPr>
+            <p:cNvPr id="44" name="Freeform 43">
+              <a:extLst>
+                <a:ext uri="{FF2B5EF4-FFF2-40B4-BE49-F238E27FC236}">
+                  <a16:creationId xmlns:a16="http://schemas.microsoft.com/office/drawing/2014/main" id="{3892C340-76EB-30E0-69F8-E458E82507C0}"/>
+                </a:ext>
+              </a:extLst>
+            </p:cNvPr>
+            <p:cNvSpPr/>
+            <p:nvPr/>
+          </p:nvSpPr>
+          <p:spPr>
+            <a:xfrm>
+              <a:off x="2338086" y="416689"/>
+              <a:ext cx="5011838" cy="5798916"/>
+            </a:xfrm>
+            <a:custGeom>
+              <a:avLst/>
+              <a:gdLst>
+                <a:gd name="connsiteX0" fmla="*/ 0 w 5011838"/>
+                <a:gd name="connsiteY0" fmla="*/ 0 h 5798916"/>
+                <a:gd name="connsiteX1" fmla="*/ 312517 w 5011838"/>
+                <a:gd name="connsiteY1" fmla="*/ 1597306 h 5798916"/>
+                <a:gd name="connsiteX2" fmla="*/ 2048719 w 5011838"/>
+                <a:gd name="connsiteY2" fmla="*/ 3148314 h 5798916"/>
+                <a:gd name="connsiteX3" fmla="*/ 3206187 w 5011838"/>
+                <a:gd name="connsiteY3" fmla="*/ 3402957 h 5798916"/>
+                <a:gd name="connsiteX4" fmla="*/ 4606724 w 5011838"/>
+                <a:gd name="connsiteY4" fmla="*/ 4317357 h 5798916"/>
+                <a:gd name="connsiteX5" fmla="*/ 5011838 w 5011838"/>
+                <a:gd name="connsiteY5" fmla="*/ 5798916 h 5798916"/>
+                <a:gd name="connsiteX0" fmla="*/ 0 w 5011838"/>
+                <a:gd name="connsiteY0" fmla="*/ 0 h 5798916"/>
+                <a:gd name="connsiteX1" fmla="*/ 312517 w 5011838"/>
+                <a:gd name="connsiteY1" fmla="*/ 1597306 h 5798916"/>
+                <a:gd name="connsiteX2" fmla="*/ 2048719 w 5011838"/>
+                <a:gd name="connsiteY2" fmla="*/ 3148314 h 5798916"/>
+                <a:gd name="connsiteX3" fmla="*/ 3206187 w 5011838"/>
+                <a:gd name="connsiteY3" fmla="*/ 3402957 h 5798916"/>
+                <a:gd name="connsiteX4" fmla="*/ 4606724 w 5011838"/>
+                <a:gd name="connsiteY4" fmla="*/ 4317357 h 5798916"/>
+                <a:gd name="connsiteX5" fmla="*/ 5011838 w 5011838"/>
+                <a:gd name="connsiteY5" fmla="*/ 5798916 h 5798916"/>
+                <a:gd name="connsiteX0" fmla="*/ 0 w 5011838"/>
+                <a:gd name="connsiteY0" fmla="*/ 0 h 5798916"/>
+                <a:gd name="connsiteX1" fmla="*/ 312517 w 5011838"/>
+                <a:gd name="connsiteY1" fmla="*/ 1597306 h 5798916"/>
+                <a:gd name="connsiteX2" fmla="*/ 2048719 w 5011838"/>
+                <a:gd name="connsiteY2" fmla="*/ 3148314 h 5798916"/>
+                <a:gd name="connsiteX3" fmla="*/ 3206187 w 5011838"/>
+                <a:gd name="connsiteY3" fmla="*/ 3402957 h 5798916"/>
+                <a:gd name="connsiteX4" fmla="*/ 4606724 w 5011838"/>
+                <a:gd name="connsiteY4" fmla="*/ 4317357 h 5798916"/>
+                <a:gd name="connsiteX5" fmla="*/ 5011838 w 5011838"/>
+                <a:gd name="connsiteY5" fmla="*/ 5798916 h 5798916"/>
+                <a:gd name="connsiteX0" fmla="*/ 0 w 5011838"/>
+                <a:gd name="connsiteY0" fmla="*/ 0 h 5798916"/>
+                <a:gd name="connsiteX1" fmla="*/ 312517 w 5011838"/>
+                <a:gd name="connsiteY1" fmla="*/ 1597306 h 5798916"/>
+                <a:gd name="connsiteX2" fmla="*/ 2048719 w 5011838"/>
+                <a:gd name="connsiteY2" fmla="*/ 3148314 h 5798916"/>
+                <a:gd name="connsiteX3" fmla="*/ 3206187 w 5011838"/>
+                <a:gd name="connsiteY3" fmla="*/ 3402957 h 5798916"/>
+                <a:gd name="connsiteX4" fmla="*/ 4606724 w 5011838"/>
+                <a:gd name="connsiteY4" fmla="*/ 4317357 h 5798916"/>
+                <a:gd name="connsiteX5" fmla="*/ 5011838 w 5011838"/>
+                <a:gd name="connsiteY5" fmla="*/ 5798916 h 5798916"/>
+                <a:gd name="connsiteX0" fmla="*/ 0 w 5011838"/>
+                <a:gd name="connsiteY0" fmla="*/ 0 h 5798916"/>
+                <a:gd name="connsiteX1" fmla="*/ 312517 w 5011838"/>
+                <a:gd name="connsiteY1" fmla="*/ 1597306 h 5798916"/>
+                <a:gd name="connsiteX2" fmla="*/ 2048719 w 5011838"/>
+                <a:gd name="connsiteY2" fmla="*/ 3148314 h 5798916"/>
+                <a:gd name="connsiteX3" fmla="*/ 3206187 w 5011838"/>
+                <a:gd name="connsiteY3" fmla="*/ 3402957 h 5798916"/>
+                <a:gd name="connsiteX4" fmla="*/ 4606724 w 5011838"/>
+                <a:gd name="connsiteY4" fmla="*/ 4317357 h 5798916"/>
+                <a:gd name="connsiteX5" fmla="*/ 5011838 w 5011838"/>
+                <a:gd name="connsiteY5" fmla="*/ 5798916 h 5798916"/>
+                <a:gd name="connsiteX0" fmla="*/ 0 w 5011838"/>
+                <a:gd name="connsiteY0" fmla="*/ 0 h 5798916"/>
+                <a:gd name="connsiteX1" fmla="*/ 312517 w 5011838"/>
+                <a:gd name="connsiteY1" fmla="*/ 1597306 h 5798916"/>
+                <a:gd name="connsiteX2" fmla="*/ 2048719 w 5011838"/>
+                <a:gd name="connsiteY2" fmla="*/ 3148314 h 5798916"/>
+                <a:gd name="connsiteX3" fmla="*/ 3206187 w 5011838"/>
+                <a:gd name="connsiteY3" fmla="*/ 3402957 h 5798916"/>
+                <a:gd name="connsiteX4" fmla="*/ 4606724 w 5011838"/>
+                <a:gd name="connsiteY4" fmla="*/ 4317357 h 5798916"/>
+                <a:gd name="connsiteX5" fmla="*/ 5011838 w 5011838"/>
+                <a:gd name="connsiteY5" fmla="*/ 5798916 h 5798916"/>
+                <a:gd name="connsiteX0" fmla="*/ 0 w 5011838"/>
+                <a:gd name="connsiteY0" fmla="*/ 0 h 5798916"/>
+                <a:gd name="connsiteX1" fmla="*/ 312517 w 5011838"/>
+                <a:gd name="connsiteY1" fmla="*/ 1597306 h 5798916"/>
+                <a:gd name="connsiteX2" fmla="*/ 2048719 w 5011838"/>
+                <a:gd name="connsiteY2" fmla="*/ 3148314 h 5798916"/>
+                <a:gd name="connsiteX3" fmla="*/ 3206187 w 5011838"/>
+                <a:gd name="connsiteY3" fmla="*/ 3402957 h 5798916"/>
+                <a:gd name="connsiteX4" fmla="*/ 4606724 w 5011838"/>
+                <a:gd name="connsiteY4" fmla="*/ 4317357 h 5798916"/>
+                <a:gd name="connsiteX5" fmla="*/ 5011838 w 5011838"/>
+                <a:gd name="connsiteY5" fmla="*/ 5798916 h 5798916"/>
+                <a:gd name="connsiteX0" fmla="*/ 0 w 5011838"/>
+                <a:gd name="connsiteY0" fmla="*/ 0 h 5798916"/>
+                <a:gd name="connsiteX1" fmla="*/ 312517 w 5011838"/>
+                <a:gd name="connsiteY1" fmla="*/ 1597306 h 5798916"/>
+                <a:gd name="connsiteX2" fmla="*/ 2048719 w 5011838"/>
+                <a:gd name="connsiteY2" fmla="*/ 3148314 h 5798916"/>
+                <a:gd name="connsiteX3" fmla="*/ 3206187 w 5011838"/>
+                <a:gd name="connsiteY3" fmla="*/ 3402957 h 5798916"/>
+                <a:gd name="connsiteX4" fmla="*/ 4606724 w 5011838"/>
+                <a:gd name="connsiteY4" fmla="*/ 4317357 h 5798916"/>
+                <a:gd name="connsiteX5" fmla="*/ 5011838 w 5011838"/>
+                <a:gd name="connsiteY5" fmla="*/ 5798916 h 5798916"/>
+                <a:gd name="connsiteX0" fmla="*/ 0 w 5011838"/>
+                <a:gd name="connsiteY0" fmla="*/ 0 h 5798916"/>
+                <a:gd name="connsiteX1" fmla="*/ 312517 w 5011838"/>
+                <a:gd name="connsiteY1" fmla="*/ 1597306 h 5798916"/>
+                <a:gd name="connsiteX2" fmla="*/ 2048719 w 5011838"/>
+                <a:gd name="connsiteY2" fmla="*/ 3148314 h 5798916"/>
+                <a:gd name="connsiteX3" fmla="*/ 3206187 w 5011838"/>
+                <a:gd name="connsiteY3" fmla="*/ 3402957 h 5798916"/>
+                <a:gd name="connsiteX4" fmla="*/ 4606724 w 5011838"/>
+                <a:gd name="connsiteY4" fmla="*/ 4317357 h 5798916"/>
+                <a:gd name="connsiteX5" fmla="*/ 5011838 w 5011838"/>
+                <a:gd name="connsiteY5" fmla="*/ 5798916 h 5798916"/>
+                <a:gd name="connsiteX0" fmla="*/ 0 w 5011838"/>
+                <a:gd name="connsiteY0" fmla="*/ 0 h 5798916"/>
+                <a:gd name="connsiteX1" fmla="*/ 439838 w 5011838"/>
+                <a:gd name="connsiteY1" fmla="*/ 1828800 h 5798916"/>
+                <a:gd name="connsiteX2" fmla="*/ 2048719 w 5011838"/>
+                <a:gd name="connsiteY2" fmla="*/ 3148314 h 5798916"/>
+                <a:gd name="connsiteX3" fmla="*/ 3206187 w 5011838"/>
+                <a:gd name="connsiteY3" fmla="*/ 3402957 h 5798916"/>
+                <a:gd name="connsiteX4" fmla="*/ 4606724 w 5011838"/>
+                <a:gd name="connsiteY4" fmla="*/ 4317357 h 5798916"/>
+                <a:gd name="connsiteX5" fmla="*/ 5011838 w 5011838"/>
+                <a:gd name="connsiteY5" fmla="*/ 5798916 h 5798916"/>
+                <a:gd name="connsiteX0" fmla="*/ 0 w 5011838"/>
+                <a:gd name="connsiteY0" fmla="*/ 0 h 5798916"/>
+                <a:gd name="connsiteX1" fmla="*/ 439838 w 5011838"/>
+                <a:gd name="connsiteY1" fmla="*/ 1828800 h 5798916"/>
+                <a:gd name="connsiteX2" fmla="*/ 2048719 w 5011838"/>
+                <a:gd name="connsiteY2" fmla="*/ 3148314 h 5798916"/>
+                <a:gd name="connsiteX3" fmla="*/ 3206187 w 5011838"/>
+                <a:gd name="connsiteY3" fmla="*/ 3402957 h 5798916"/>
+                <a:gd name="connsiteX4" fmla="*/ 4606724 w 5011838"/>
+                <a:gd name="connsiteY4" fmla="*/ 4317357 h 5798916"/>
+                <a:gd name="connsiteX5" fmla="*/ 5011838 w 5011838"/>
+                <a:gd name="connsiteY5" fmla="*/ 5798916 h 5798916"/>
+                <a:gd name="connsiteX0" fmla="*/ 0 w 5011838"/>
+                <a:gd name="connsiteY0" fmla="*/ 0 h 5798916"/>
+                <a:gd name="connsiteX1" fmla="*/ 439838 w 5011838"/>
+                <a:gd name="connsiteY1" fmla="*/ 1828800 h 5798916"/>
+                <a:gd name="connsiteX2" fmla="*/ 3206187 w 5011838"/>
+                <a:gd name="connsiteY2" fmla="*/ 3402957 h 5798916"/>
+                <a:gd name="connsiteX3" fmla="*/ 4606724 w 5011838"/>
+                <a:gd name="connsiteY3" fmla="*/ 4317357 h 5798916"/>
+                <a:gd name="connsiteX4" fmla="*/ 5011838 w 5011838"/>
+                <a:gd name="connsiteY4" fmla="*/ 5798916 h 5798916"/>
+                <a:gd name="connsiteX0" fmla="*/ 0 w 5011838"/>
+                <a:gd name="connsiteY0" fmla="*/ 0 h 5798916"/>
+                <a:gd name="connsiteX1" fmla="*/ 439838 w 5011838"/>
+                <a:gd name="connsiteY1" fmla="*/ 1828800 h 5798916"/>
+                <a:gd name="connsiteX2" fmla="*/ 2615878 w 5011838"/>
+                <a:gd name="connsiteY2" fmla="*/ 3264061 h 5798916"/>
+                <a:gd name="connsiteX3" fmla="*/ 4606724 w 5011838"/>
+                <a:gd name="connsiteY3" fmla="*/ 4317357 h 5798916"/>
+                <a:gd name="connsiteX4" fmla="*/ 5011838 w 5011838"/>
+                <a:gd name="connsiteY4" fmla="*/ 5798916 h 5798916"/>
+                <a:gd name="connsiteX0" fmla="*/ 0 w 5011838"/>
+                <a:gd name="connsiteY0" fmla="*/ 0 h 5798916"/>
+                <a:gd name="connsiteX1" fmla="*/ 439838 w 5011838"/>
+                <a:gd name="connsiteY1" fmla="*/ 1828800 h 5798916"/>
+                <a:gd name="connsiteX2" fmla="*/ 2615878 w 5011838"/>
+                <a:gd name="connsiteY2" fmla="*/ 3264061 h 5798916"/>
+                <a:gd name="connsiteX3" fmla="*/ 4606724 w 5011838"/>
+                <a:gd name="connsiteY3" fmla="*/ 4317357 h 5798916"/>
+                <a:gd name="connsiteX4" fmla="*/ 5011838 w 5011838"/>
+                <a:gd name="connsiteY4" fmla="*/ 5798916 h 5798916"/>
+                <a:gd name="connsiteX0" fmla="*/ 0 w 5011838"/>
+                <a:gd name="connsiteY0" fmla="*/ 0 h 5798916"/>
+                <a:gd name="connsiteX1" fmla="*/ 439838 w 5011838"/>
+                <a:gd name="connsiteY1" fmla="*/ 1828800 h 5798916"/>
+                <a:gd name="connsiteX2" fmla="*/ 2615878 w 5011838"/>
+                <a:gd name="connsiteY2" fmla="*/ 3264061 h 5798916"/>
+                <a:gd name="connsiteX3" fmla="*/ 4606724 w 5011838"/>
+                <a:gd name="connsiteY3" fmla="*/ 4317357 h 5798916"/>
+                <a:gd name="connsiteX4" fmla="*/ 5011838 w 5011838"/>
+                <a:gd name="connsiteY4" fmla="*/ 5798916 h 5798916"/>
+                <a:gd name="connsiteX0" fmla="*/ 0 w 5011838"/>
+                <a:gd name="connsiteY0" fmla="*/ 0 h 5798916"/>
+                <a:gd name="connsiteX1" fmla="*/ 439838 w 5011838"/>
+                <a:gd name="connsiteY1" fmla="*/ 1828800 h 5798916"/>
+                <a:gd name="connsiteX2" fmla="*/ 2615878 w 5011838"/>
+                <a:gd name="connsiteY2" fmla="*/ 3264061 h 5798916"/>
+                <a:gd name="connsiteX3" fmla="*/ 4606724 w 5011838"/>
+                <a:gd name="connsiteY3" fmla="*/ 4317357 h 5798916"/>
+                <a:gd name="connsiteX4" fmla="*/ 5011838 w 5011838"/>
+                <a:gd name="connsiteY4" fmla="*/ 5798916 h 5798916"/>
+                <a:gd name="connsiteX0" fmla="*/ 0 w 5011838"/>
+                <a:gd name="connsiteY0" fmla="*/ 0 h 5798916"/>
+                <a:gd name="connsiteX1" fmla="*/ 439838 w 5011838"/>
+                <a:gd name="connsiteY1" fmla="*/ 1828800 h 5798916"/>
+                <a:gd name="connsiteX2" fmla="*/ 2615878 w 5011838"/>
+                <a:gd name="connsiteY2" fmla="*/ 3264061 h 5798916"/>
+                <a:gd name="connsiteX3" fmla="*/ 4606724 w 5011838"/>
+                <a:gd name="connsiteY3" fmla="*/ 4317357 h 5798916"/>
+                <a:gd name="connsiteX4" fmla="*/ 5011838 w 5011838"/>
+                <a:gd name="connsiteY4" fmla="*/ 5798916 h 5798916"/>
+              </a:gdLst>
+              <a:ahLst/>
+              <a:cxnLst>
+                <a:cxn ang="0">
+                  <a:pos x="connsiteX0" y="connsiteY0"/>
+                </a:cxn>
+                <a:cxn ang="0">
+                  <a:pos x="connsiteX1" y="connsiteY1"/>
+                </a:cxn>
+                <a:cxn ang="0">
+                  <a:pos x="connsiteX2" y="connsiteY2"/>
+                </a:cxn>
+                <a:cxn ang="0">
+                  <a:pos x="connsiteX3" y="connsiteY3"/>
+                </a:cxn>
+                <a:cxn ang="0">
+                  <a:pos x="connsiteX4" y="connsiteY4"/>
+                </a:cxn>
+              </a:cxnLst>
+              <a:rect l="l" t="t" r="r" b="b"/>
+              <a:pathLst>
+                <a:path w="5011838" h="5798916">
+                  <a:moveTo>
+                    <a:pt x="0" y="0"/>
+                  </a:moveTo>
+                  <a:cubicBezTo>
+                    <a:pt x="104172" y="891250"/>
+                    <a:pt x="27007" y="625033"/>
+                    <a:pt x="439838" y="1828800"/>
+                  </a:cubicBezTo>
+                  <a:cubicBezTo>
+                    <a:pt x="852669" y="3032567"/>
+                    <a:pt x="1574156" y="2999772"/>
+                    <a:pt x="2615878" y="3264061"/>
+                  </a:cubicBezTo>
+                  <a:cubicBezTo>
+                    <a:pt x="3657600" y="3528350"/>
+                    <a:pt x="4392592" y="3536066"/>
+                    <a:pt x="4606724" y="4317357"/>
+                  </a:cubicBezTo>
+                  <a:lnTo>
+                    <a:pt x="5011838" y="5798916"/>
+                  </a:lnTo>
+                </a:path>
+              </a:pathLst>
+            </a:custGeom>
+            <a:noFill/>
+            <a:ln>
+              <a:solidFill>
+                <a:srgbClr val="00B0F0"/>
+              </a:solidFill>
+            </a:ln>
+          </p:spPr>
+          <p:style>
+            <a:lnRef idx="2">
+              <a:schemeClr val="accent1">
+                <a:shade val="15000"/>
+              </a:schemeClr>
+            </a:lnRef>
+            <a:fillRef idx="1">
+              <a:schemeClr val="accent1"/>
+            </a:fillRef>
+            <a:effectRef idx="0">
+              <a:schemeClr val="accent1"/>
+            </a:effectRef>
+            <a:fontRef idx="minor">
+              <a:schemeClr val="lt1"/>
+            </a:fontRef>
+          </p:style>
+          <p:txBody>
+            <a:bodyPr rtlCol="0" anchor="ctr"/>
+            <a:lstStyle/>
+            <a:p>
+              <a:pPr algn="ctr"/>
+              <a:endParaRPr lang="en-NL"/>
+            </a:p>
+          </p:txBody>
+        </p:sp>
+      </p:grpSp>
+    </p:spTree>
+    <p:extLst>
+      <p:ext uri="{BB962C8B-B14F-4D97-AF65-F5344CB8AC3E}">
+        <p14:creationId xmlns:p14="http://schemas.microsoft.com/office/powerpoint/2010/main" val="3047317529"/>
       </p:ext>
     </p:extLst>
   </p:cSld>

</xml_diff>